<commit_message>
Adding the final verison of presentation
</commit_message>
<xml_diff>
--- a/TeamProteinSummary.pptx
+++ b/TeamProteinSummary.pptx
@@ -8,16 +8,17 @@
     <p:sldId id="256" r:id="rId2"/>
     <p:sldId id="257" r:id="rId3"/>
     <p:sldId id="258" r:id="rId4"/>
-    <p:sldId id="268" r:id="rId5"/>
-    <p:sldId id="259" r:id="rId6"/>
-    <p:sldId id="264" r:id="rId7"/>
-    <p:sldId id="260" r:id="rId8"/>
-    <p:sldId id="261" r:id="rId9"/>
+    <p:sldId id="269" r:id="rId5"/>
+    <p:sldId id="268" r:id="rId6"/>
+    <p:sldId id="259" r:id="rId7"/>
+    <p:sldId id="264" r:id="rId8"/>
+    <p:sldId id="260" r:id="rId9"/>
     <p:sldId id="262" r:id="rId10"/>
     <p:sldId id="265" r:id="rId11"/>
     <p:sldId id="263" r:id="rId12"/>
     <p:sldId id="266" r:id="rId13"/>
-    <p:sldId id="267" r:id="rId14"/>
+    <p:sldId id="270" r:id="rId14"/>
+    <p:sldId id="267" r:id="rId15"/>
   </p:sldIdLst>
   <p:sldSz cx="9144000" cy="6858000" type="screen4x3"/>
   <p:notesSz cx="6858000" cy="9144000"/>
@@ -300,7 +301,7 @@
           <a:p>
             <a:fld id="{A43A3EB1-33AD-EB41-A4F0-FAD83AF6F373}" type="datetimeFigureOut">
               <a:rPr lang="en-US" smtClean="0"/>
-              <a:t>12/03/15</a:t>
+              <a:t>15/03/15</a:t>
             </a:fld>
             <a:endParaRPr lang="en-US"/>
           </a:p>
@@ -470,7 +471,7 @@
           <a:p>
             <a:fld id="{A43A3EB1-33AD-EB41-A4F0-FAD83AF6F373}" type="datetimeFigureOut">
               <a:rPr lang="en-US" smtClean="0"/>
-              <a:t>12/03/15</a:t>
+              <a:t>15/03/15</a:t>
             </a:fld>
             <a:endParaRPr lang="en-US"/>
           </a:p>
@@ -650,7 +651,7 @@
           <a:p>
             <a:fld id="{A43A3EB1-33AD-EB41-A4F0-FAD83AF6F373}" type="datetimeFigureOut">
               <a:rPr lang="en-US" smtClean="0"/>
-              <a:t>12/03/15</a:t>
+              <a:t>15/03/15</a:t>
             </a:fld>
             <a:endParaRPr lang="en-US"/>
           </a:p>
@@ -820,7 +821,7 @@
           <a:p>
             <a:fld id="{A43A3EB1-33AD-EB41-A4F0-FAD83AF6F373}" type="datetimeFigureOut">
               <a:rPr lang="en-US" smtClean="0"/>
-              <a:t>12/03/15</a:t>
+              <a:t>15/03/15</a:t>
             </a:fld>
             <a:endParaRPr lang="en-US"/>
           </a:p>
@@ -1066,7 +1067,7 @@
           <a:p>
             <a:fld id="{A43A3EB1-33AD-EB41-A4F0-FAD83AF6F373}" type="datetimeFigureOut">
               <a:rPr lang="en-US" smtClean="0"/>
-              <a:t>12/03/15</a:t>
+              <a:t>15/03/15</a:t>
             </a:fld>
             <a:endParaRPr lang="en-US"/>
           </a:p>
@@ -1354,7 +1355,7 @@
           <a:p>
             <a:fld id="{A43A3EB1-33AD-EB41-A4F0-FAD83AF6F373}" type="datetimeFigureOut">
               <a:rPr lang="en-US" smtClean="0"/>
-              <a:t>12/03/15</a:t>
+              <a:t>15/03/15</a:t>
             </a:fld>
             <a:endParaRPr lang="en-US"/>
           </a:p>
@@ -1776,7 +1777,7 @@
           <a:p>
             <a:fld id="{A43A3EB1-33AD-EB41-A4F0-FAD83AF6F373}" type="datetimeFigureOut">
               <a:rPr lang="en-US" smtClean="0"/>
-              <a:t>12/03/15</a:t>
+              <a:t>15/03/15</a:t>
             </a:fld>
             <a:endParaRPr lang="en-US"/>
           </a:p>
@@ -1894,7 +1895,7 @@
           <a:p>
             <a:fld id="{A43A3EB1-33AD-EB41-A4F0-FAD83AF6F373}" type="datetimeFigureOut">
               <a:rPr lang="en-US" smtClean="0"/>
-              <a:t>12/03/15</a:t>
+              <a:t>15/03/15</a:t>
             </a:fld>
             <a:endParaRPr lang="en-US"/>
           </a:p>
@@ -1989,7 +1990,7 @@
           <a:p>
             <a:fld id="{A43A3EB1-33AD-EB41-A4F0-FAD83AF6F373}" type="datetimeFigureOut">
               <a:rPr lang="en-US" smtClean="0"/>
-              <a:t>12/03/15</a:t>
+              <a:t>15/03/15</a:t>
             </a:fld>
             <a:endParaRPr lang="en-US"/>
           </a:p>
@@ -2266,7 +2267,7 @@
           <a:p>
             <a:fld id="{A43A3EB1-33AD-EB41-A4F0-FAD83AF6F373}" type="datetimeFigureOut">
               <a:rPr lang="en-US" smtClean="0"/>
-              <a:t>12/03/15</a:t>
+              <a:t>15/03/15</a:t>
             </a:fld>
             <a:endParaRPr lang="en-US"/>
           </a:p>
@@ -2519,7 +2520,7 @@
           <a:p>
             <a:fld id="{A43A3EB1-33AD-EB41-A4F0-FAD83AF6F373}" type="datetimeFigureOut">
               <a:rPr lang="en-US" smtClean="0"/>
-              <a:t>12/03/15</a:t>
+              <a:t>15/03/15</a:t>
             </a:fld>
             <a:endParaRPr lang="en-US"/>
           </a:p>
@@ -2732,7 +2733,7 @@
           <a:p>
             <a:fld id="{A43A3EB1-33AD-EB41-A4F0-FAD83AF6F373}" type="datetimeFigureOut">
               <a:rPr lang="en-US" smtClean="0"/>
-              <a:t>12/03/15</a:t>
+              <a:t>15/03/15</a:t>
             </a:fld>
             <a:endParaRPr lang="en-US"/>
           </a:p>
@@ -3348,8 +3349,8 @@
         </p:nvSpPr>
         <p:spPr>
           <a:xfrm>
-            <a:off x="797187" y="1904906"/>
-            <a:ext cx="7889613" cy="2836674"/>
+            <a:off x="621531" y="1607686"/>
+            <a:ext cx="7889613" cy="4683333"/>
           </a:xfrm>
           <a:prstGeom prst="rect">
             <a:avLst/>
@@ -3372,10 +3373,10 @@
             <a:r>
               <a:rPr lang="en-US" sz="2000" dirty="0" smtClean="0">
                 <a:solidFill>
-                  <a:srgbClr val="FF0000"/>
+                  <a:srgbClr val="000000"/>
                 </a:solidFill>
               </a:rPr>
-              <a:t>Model is prepared using COPASI</a:t>
+              <a:t>Assembly of 30S AND 50S</a:t>
             </a:r>
           </a:p>
           <a:p>
@@ -3389,11 +3390,24 @@
             <a:r>
               <a:rPr lang="en-US" sz="2000" dirty="0" smtClean="0">
                 <a:solidFill>
-                  <a:srgbClr val="FF0000"/>
+                  <a:srgbClr val="000000"/>
                 </a:solidFill>
               </a:rPr>
-              <a:t>Reactions take place simultaneously and in random order when requirements are satisfied.</a:t>
-            </a:r>
+              <a:t>30S: Prepared using </a:t>
+            </a:r>
+            <a:r>
+              <a:rPr lang="en-US" sz="2000" dirty="0" err="1" smtClean="0">
+                <a:solidFill>
+                  <a:srgbClr val="000000"/>
+                </a:solidFill>
+              </a:rPr>
+              <a:t>CellDesigner</a:t>
+            </a:r>
+            <a:endParaRPr lang="en-US" sz="2000" dirty="0" smtClean="0">
+              <a:solidFill>
+                <a:srgbClr val="000000"/>
+              </a:solidFill>
+            </a:endParaRPr>
           </a:p>
           <a:p>
             <a:pPr marL="285750" indent="-285750">
@@ -3406,10 +3420,26 @@
             <a:r>
               <a:rPr lang="en-US" sz="2000" dirty="0" smtClean="0">
                 <a:solidFill>
-                  <a:srgbClr val="FF0000"/>
+                  <a:srgbClr val="000000"/>
                 </a:solidFill>
               </a:rPr>
-              <a:t>Model tested, seems valid.</a:t>
+              <a:t>50S: Ad-hoc Python script was used to generate 50S </a:t>
+            </a:r>
+            <a:r>
+              <a:rPr lang="en-US" sz="2000" dirty="0" smtClean="0">
+                <a:solidFill>
+                  <a:srgbClr val="000000"/>
+                </a:solidFill>
+              </a:rPr>
+              <a:t>starting </a:t>
+            </a:r>
+            <a:r>
+              <a:rPr lang="en-US" sz="2000" dirty="0" smtClean="0">
+                <a:solidFill>
+                  <a:srgbClr val="000000"/>
+                </a:solidFill>
+              </a:rPr>
+              <a:t>from the 30S template</a:t>
             </a:r>
           </a:p>
           <a:p>
@@ -3423,10 +3453,34 @@
             <a:r>
               <a:rPr lang="en-US" sz="2000" dirty="0" smtClean="0">
                 <a:solidFill>
-                  <a:srgbClr val="FF0000"/>
+                  <a:srgbClr val="000000"/>
                 </a:solidFill>
               </a:rPr>
-              <a:t>etc.</a:t>
+              <a:t>SBML and SBGN exported from </a:t>
+            </a:r>
+            <a:r>
+              <a:rPr lang="en-US" sz="2000" dirty="0" err="1" smtClean="0">
+                <a:solidFill>
+                  <a:srgbClr val="000000"/>
+                </a:solidFill>
+              </a:rPr>
+              <a:t>CellDesigner</a:t>
+            </a:r>
+            <a:r>
+              <a:rPr lang="en-US" sz="2000" dirty="0" smtClean="0">
+                <a:solidFill>
+                  <a:srgbClr val="000000"/>
+                </a:solidFill>
+              </a:rPr>
+              <a:t> </a:t>
+            </a:r>
+            <a:r>
+              <a:rPr lang="en-US" sz="2000" dirty="0" smtClean="0">
+                <a:solidFill>
+                  <a:srgbClr val="000000"/>
+                </a:solidFill>
+              </a:rPr>
+              <a:t>then manually edited to add stoichiometry</a:t>
             </a:r>
           </a:p>
           <a:p>
@@ -3437,11 +3491,80 @@
               <a:buFont typeface="Arial"/>
               <a:buChar char="•"/>
             </a:pPr>
-            <a:endParaRPr lang="en-US" sz="2000" dirty="0">
-              <a:solidFill>
-                <a:srgbClr val="FF0000"/>
-              </a:solidFill>
-            </a:endParaRPr>
+            <a:r>
+              <a:rPr lang="en-US" sz="2000" dirty="0" smtClean="0">
+                <a:solidFill>
+                  <a:srgbClr val="000000"/>
+                </a:solidFill>
+              </a:rPr>
+              <a:t>Reactions take place simultaneously and in random order when requirements are satisfied</a:t>
+            </a:r>
+          </a:p>
+          <a:p>
+            <a:pPr marL="285750" indent="-285750">
+              <a:lnSpc>
+                <a:spcPct val="150000"/>
+              </a:lnSpc>
+              <a:buFont typeface="Arial"/>
+              <a:buChar char="•"/>
+            </a:pPr>
+            <a:r>
+              <a:rPr lang="en-US" sz="2000" dirty="0" smtClean="0">
+                <a:solidFill>
+                  <a:srgbClr val="000000"/>
+                </a:solidFill>
+              </a:rPr>
+              <a:t>Random simulation executed </a:t>
+            </a:r>
+            <a:r>
+              <a:rPr lang="en-US" sz="2000" dirty="0">
+                <a:solidFill>
+                  <a:srgbClr val="000000"/>
+                </a:solidFill>
+              </a:rPr>
+              <a:t>i</a:t>
+            </a:r>
+            <a:r>
+              <a:rPr lang="en-US" sz="2000" dirty="0" smtClean="0">
+                <a:solidFill>
+                  <a:srgbClr val="000000"/>
+                </a:solidFill>
+              </a:rPr>
+              <a:t>n COPASI </a:t>
+            </a:r>
+            <a:r>
+              <a:rPr lang="en-US" sz="2000" dirty="0" smtClean="0">
+                <a:solidFill>
+                  <a:srgbClr val="000000"/>
+                </a:solidFill>
+              </a:rPr>
+              <a:t>using </a:t>
+            </a:r>
+            <a:r>
+              <a:rPr lang="en-US" sz="2000" dirty="0" smtClean="0">
+                <a:solidFill>
+                  <a:srgbClr val="000000"/>
+                </a:solidFill>
+              </a:rPr>
+              <a:t>a stochastic simulator </a:t>
+            </a:r>
+          </a:p>
+          <a:p>
+            <a:pPr marL="285750" indent="-285750">
+              <a:lnSpc>
+                <a:spcPct val="150000"/>
+              </a:lnSpc>
+              <a:buFont typeface="Arial"/>
+              <a:buChar char="•"/>
+            </a:pPr>
+            <a:r>
+              <a:rPr lang="en-US" sz="2000" dirty="0" smtClean="0">
+                <a:solidFill>
+                  <a:srgbClr val="000000"/>
+                </a:solidFill>
+              </a:rPr>
+              <a:t>Model tested manually, seems valid.</a:t>
+            </a:r>
           </a:p>
         </p:txBody>
       </p:sp>
@@ -3455,6 +3578,13 @@
   <p:clrMapOvr>
     <a:masterClrMapping/>
   </p:clrMapOvr>
+  <p:timing>
+    <p:tnLst>
+      <p:par>
+        <p:cTn xmlns:p14="http://schemas.microsoft.com/office/powerpoint/2010/main" id="1" dur="indefinite" restart="never" nodeType="tmRoot"/>
+      </p:par>
+    </p:tnLst>
+  </p:timing>
 </p:sld>
 </file>
 
@@ -3540,6 +3670,13 @@
   <p:clrMapOvr>
     <a:masterClrMapping/>
   </p:clrMapOvr>
+  <p:timing>
+    <p:tnLst>
+      <p:par>
+        <p:cTn xmlns:p14="http://schemas.microsoft.com/office/powerpoint/2010/main" id="1" dur="indefinite" restart="never" nodeType="tmRoot"/>
+      </p:par>
+    </p:tnLst>
+  </p:timing>
 </p:sld>
 </file>
 
@@ -3593,8 +3730,8 @@
         </p:nvSpPr>
         <p:spPr>
           <a:xfrm>
-            <a:off x="797187" y="1904906"/>
-            <a:ext cx="7889613" cy="2836674"/>
+            <a:off x="672228" y="1904906"/>
+            <a:ext cx="8014572" cy="3385542"/>
           </a:xfrm>
           <a:prstGeom prst="rect">
             <a:avLst/>
@@ -3615,9 +3752,9 @@
               <a:buChar char="•"/>
             </a:pPr>
             <a:r>
-              <a:rPr lang="en-US" sz="2000" dirty="0" smtClean="0">
-                <a:solidFill>
-                  <a:srgbClr val="FF0000"/>
+              <a:rPr lang="en-US" sz="2400" dirty="0" smtClean="0">
+                <a:solidFill>
+                  <a:srgbClr val="000000"/>
                 </a:solidFill>
               </a:rPr>
               <a:t>Model is prepared using COPASI</a:t>
@@ -3632,9 +3769,9 @@
               <a:buChar char="•"/>
             </a:pPr>
             <a:r>
-              <a:rPr lang="en-US" sz="2000" dirty="0" smtClean="0">
-                <a:solidFill>
-                  <a:srgbClr val="FF0000"/>
+              <a:rPr lang="en-US" sz="2400" dirty="0" smtClean="0">
+                <a:solidFill>
+                  <a:srgbClr val="000000"/>
                 </a:solidFill>
               </a:rPr>
               <a:t>All/nothing type reactions</a:t>
@@ -3649,13 +3786,26 @@
               <a:buChar char="•"/>
             </a:pPr>
             <a:r>
-              <a:rPr lang="en-US" sz="2000" dirty="0" smtClean="0">
-                <a:solidFill>
-                  <a:srgbClr val="FF0000"/>
+              <a:rPr lang="en-US" sz="2400" dirty="0" smtClean="0">
+                <a:solidFill>
+                  <a:srgbClr val="000000"/>
                 </a:solidFill>
               </a:rPr>
-              <a:t>Assignments are used…</a:t>
-            </a:r>
+              <a:t>Assignments are </a:t>
+            </a:r>
+            <a:r>
+              <a:rPr lang="en-US" sz="2400" dirty="0" smtClean="0">
+                <a:solidFill>
+                  <a:srgbClr val="000000"/>
+                </a:solidFill>
+              </a:rPr>
+              <a:t>used</a:t>
+            </a:r>
+            <a:endParaRPr lang="en-US" sz="2400" dirty="0" smtClean="0">
+              <a:solidFill>
+                <a:srgbClr val="000000"/>
+              </a:solidFill>
+            </a:endParaRPr>
           </a:p>
           <a:p>
             <a:pPr marL="285750" indent="-285750">
@@ -3666,12 +3816,44 @@
               <a:buChar char="•"/>
             </a:pPr>
             <a:r>
-              <a:rPr lang="en-US" sz="2000" dirty="0" smtClean="0">
-                <a:solidFill>
-                  <a:srgbClr val="FF0000"/>
+              <a:rPr lang="en-US" sz="2400" dirty="0">
+                <a:solidFill>
+                  <a:srgbClr val="000000"/>
                 </a:solidFill>
               </a:rPr>
-              <a:t>Model tested, seems valid.</a:t>
+              <a:t>We did a round-trip: </a:t>
+            </a:r>
+            <a:r>
+              <a:rPr lang="en-US" sz="2400" dirty="0" smtClean="0">
+                <a:solidFill>
+                  <a:srgbClr val="000000"/>
+                </a:solidFill>
+              </a:rPr>
+              <a:t>COPASI </a:t>
+            </a:r>
+            <a:r>
+              <a:rPr lang="en-US" sz="2400" dirty="0">
+                <a:solidFill>
+                  <a:srgbClr val="000000"/>
+                </a:solidFill>
+              </a:rPr>
+              <a:t>to SBML back to </a:t>
+            </a:r>
+            <a:r>
+              <a:rPr lang="en-US" sz="2400" dirty="0" smtClean="0">
+                <a:solidFill>
+                  <a:srgbClr val="000000"/>
+                </a:solidFill>
+              </a:rPr>
+              <a:t>COPASI. Model </a:t>
+            </a:r>
+            <a:r>
+              <a:rPr lang="en-US" sz="2400" dirty="0">
+                <a:solidFill>
+                  <a:srgbClr val="000000"/>
+                </a:solidFill>
+              </a:rPr>
+              <a:t>tested, seems valid.</a:t>
             </a:r>
           </a:p>
           <a:p>
@@ -3682,29 +3864,11 @@
               <a:buFont typeface="Arial"/>
               <a:buChar char="•"/>
             </a:pPr>
-            <a:r>
-              <a:rPr lang="en-US" sz="2000" dirty="0" err="1" smtClean="0">
-                <a:solidFill>
-                  <a:srgbClr val="FF0000"/>
-                </a:solidFill>
-              </a:rPr>
-              <a:t>etc</a:t>
-            </a:r>
-            <a:endParaRPr lang="en-US" sz="2000" dirty="0" smtClean="0">
+            <a:endParaRPr lang="en-US" sz="2400" dirty="0">
               <a:solidFill>
-                <a:srgbClr val="FF0000"/>
+                <a:srgbClr val="000000"/>
               </a:solidFill>
             </a:endParaRPr>
-          </a:p>
-          <a:p>
-            <a:pPr marL="285750" indent="-285750">
-              <a:lnSpc>
-                <a:spcPct val="150000"/>
-              </a:lnSpc>
-              <a:buFont typeface="Arial"/>
-              <a:buChar char="•"/>
-            </a:pPr>
-            <a:endParaRPr lang="en-US" sz="2000" dirty="0"/>
           </a:p>
         </p:txBody>
       </p:sp>
@@ -3718,6 +3882,13 @@
   <p:clrMapOvr>
     <a:masterClrMapping/>
   </p:clrMapOvr>
+  <p:timing>
+    <p:tnLst>
+      <p:par>
+        <p:cTn xmlns:p14="http://schemas.microsoft.com/office/powerpoint/2010/main" id="1" dur="indefinite" restart="never" nodeType="tmRoot"/>
+      </p:par>
+    </p:tnLst>
+  </p:timing>
 </p:sld>
 </file>
 
@@ -3757,9 +3928,238 @@
           <a:p>
             <a:r>
               <a:rPr lang="en-US" dirty="0" smtClean="0"/>
+              <a:t>SBGN</a:t>
+            </a:r>
+            <a:endParaRPr lang="en-US" dirty="0"/>
+          </a:p>
+        </p:txBody>
+      </p:sp>
+      <p:sp>
+        <p:nvSpPr>
+          <p:cNvPr id="3" name="TextBox 2"/>
+          <p:cNvSpPr txBox="1"/>
+          <p:nvPr/>
+        </p:nvSpPr>
+        <p:spPr>
+          <a:xfrm>
+            <a:off x="549916" y="1833166"/>
+            <a:ext cx="7994196" cy="2308324"/>
+          </a:xfrm>
+          <a:prstGeom prst="rect">
+            <a:avLst/>
+          </a:prstGeom>
+          <a:noFill/>
+        </p:spPr>
+        <p:txBody>
+          <a:bodyPr wrap="none" rtlCol="0">
+            <a:spAutoFit/>
+          </a:bodyPr>
+          <a:lstStyle/>
+          <a:p>
+            <a:r>
+              <a:rPr lang="en-US" sz="2400" dirty="0" smtClean="0"/>
+              <a:t>We used </a:t>
+            </a:r>
+            <a:r>
+              <a:rPr lang="en-US" sz="2400" dirty="0" err="1" smtClean="0"/>
+              <a:t>CellDesigner</a:t>
+            </a:r>
+            <a:r>
+              <a:rPr lang="en-US" sz="2400" dirty="0" smtClean="0"/>
+              <a:t> for:</a:t>
+            </a:r>
+          </a:p>
+          <a:p>
+            <a:pPr marL="285750" indent="-285750">
+              <a:buFontTx/>
+              <a:buChar char="-"/>
+            </a:pPr>
+            <a:r>
+              <a:rPr lang="en-US" sz="2400" dirty="0" smtClean="0"/>
+              <a:t>Terminal Organelle Assembly</a:t>
+            </a:r>
+          </a:p>
+          <a:p>
+            <a:pPr marL="285750" indent="-285750">
+              <a:buFontTx/>
+              <a:buChar char="-"/>
+            </a:pPr>
+            <a:r>
+              <a:rPr lang="en-US" sz="2400" dirty="0" smtClean="0"/>
+              <a:t>Part of Ribosome Assembly</a:t>
+            </a:r>
+          </a:p>
+          <a:p>
+            <a:pPr marL="285750" indent="-285750">
+              <a:buFontTx/>
+              <a:buChar char="-"/>
+            </a:pPr>
+            <a:endParaRPr lang="en-US" sz="2400" dirty="0"/>
+          </a:p>
+          <a:p>
+            <a:r>
+              <a:rPr lang="en-US" sz="2400" dirty="0" smtClean="0"/>
+              <a:t>The models can be opened in VANTED and exported to SBGN</a:t>
+            </a:r>
+          </a:p>
+          <a:p>
+            <a:r>
+              <a:rPr lang="en-US" sz="2400" dirty="0" smtClean="0"/>
+              <a:t>Models also exported to SBML and then imported into COPASI </a:t>
+            </a:r>
+            <a:endParaRPr lang="en-US" sz="2400" dirty="0"/>
+          </a:p>
+        </p:txBody>
+      </p:sp>
+    </p:spTree>
+    <p:extLst>
+      <p:ext uri="{BB962C8B-B14F-4D97-AF65-F5344CB8AC3E}">
+        <p14:creationId xmlns:p14="http://schemas.microsoft.com/office/powerpoint/2010/main" val="2587957188"/>
+      </p:ext>
+    </p:extLst>
+  </p:cSld>
+  <p:clrMapOvr>
+    <a:masterClrMapping/>
+  </p:clrMapOvr>
+  <p:timing>
+    <p:tnLst>
+      <p:par>
+        <p:cTn xmlns:p14="http://schemas.microsoft.com/office/powerpoint/2010/main" id="1" dur="indefinite" restart="never" nodeType="tmRoot"/>
+      </p:par>
+    </p:tnLst>
+  </p:timing>
+</p:sld>
+</file>
+
+<file path=ppt/slides/slide14.xml><?xml version="1.0" encoding="utf-8"?>
+<p:sld xmlns:a="http://schemas.openxmlformats.org/drawingml/2006/main" xmlns:r="http://schemas.openxmlformats.org/officeDocument/2006/relationships" xmlns:p="http://schemas.openxmlformats.org/presentationml/2006/main">
+  <p:cSld>
+    <p:spTree>
+      <p:nvGrpSpPr>
+        <p:cNvPr id="1" name=""/>
+        <p:cNvGrpSpPr/>
+        <p:nvPr/>
+      </p:nvGrpSpPr>
+      <p:grpSpPr>
+        <a:xfrm>
+          <a:off x="0" y="0"/>
+          <a:ext cx="0" cy="0"/>
+          <a:chOff x="0" y="0"/>
+          <a:chExt cx="0" cy="0"/>
+        </a:xfrm>
+      </p:grpSpPr>
+      <p:sp>
+        <p:nvSpPr>
+          <p:cNvPr id="2" name="Title 1"/>
+          <p:cNvSpPr>
+            <a:spLocks noGrp="1"/>
+          </p:cNvSpPr>
+          <p:nvPr>
+            <p:ph type="title"/>
+          </p:nvPr>
+        </p:nvSpPr>
+        <p:spPr/>
+        <p:txBody>
+          <a:bodyPr>
+            <a:normAutofit/>
+          </a:bodyPr>
+          <a:lstStyle/>
+          <a:p>
+            <a:r>
+              <a:rPr lang="en-US" dirty="0" smtClean="0"/>
               <a:t>Challenges/Problems</a:t>
             </a:r>
             <a:endParaRPr lang="en-US" dirty="0"/>
+          </a:p>
+        </p:txBody>
+      </p:sp>
+      <p:sp>
+        <p:nvSpPr>
+          <p:cNvPr id="3" name="TextBox 2"/>
+          <p:cNvSpPr txBox="1"/>
+          <p:nvPr/>
+        </p:nvSpPr>
+        <p:spPr>
+          <a:xfrm>
+            <a:off x="880300" y="1689130"/>
+            <a:ext cx="7329169" cy="3385542"/>
+          </a:xfrm>
+          <a:prstGeom prst="rect">
+            <a:avLst/>
+          </a:prstGeom>
+          <a:noFill/>
+        </p:spPr>
+        <p:txBody>
+          <a:bodyPr wrap="square" rtlCol="0">
+            <a:spAutoFit/>
+          </a:bodyPr>
+          <a:lstStyle/>
+          <a:p>
+            <a:pPr>
+              <a:lnSpc>
+                <a:spcPct val="150000"/>
+              </a:lnSpc>
+            </a:pPr>
+            <a:endParaRPr lang="en-US" sz="2400" dirty="0" smtClean="0"/>
+          </a:p>
+          <a:p>
+            <a:pPr marL="285750" indent="-285750">
+              <a:lnSpc>
+                <a:spcPct val="150000"/>
+              </a:lnSpc>
+              <a:buFont typeface="Arial"/>
+              <a:buChar char="•"/>
+            </a:pPr>
+            <a:r>
+              <a:rPr lang="en-US" sz="2400" dirty="0" smtClean="0"/>
+              <a:t>Random </a:t>
+            </a:r>
+            <a:r>
+              <a:rPr lang="en-US" sz="2400" dirty="0" smtClean="0"/>
+              <a:t>distribution</a:t>
+            </a:r>
+            <a:endParaRPr lang="en-US" sz="2400" dirty="0" smtClean="0"/>
+          </a:p>
+          <a:p>
+            <a:pPr marL="742950" lvl="1" indent="-285750">
+              <a:lnSpc>
+                <a:spcPct val="150000"/>
+              </a:lnSpc>
+              <a:buFont typeface="Arial"/>
+              <a:buChar char="•"/>
+            </a:pPr>
+            <a:r>
+              <a:rPr lang="en-US" sz="2400" dirty="0" smtClean="0"/>
+              <a:t>We have found a way to do that using weighted rate constants and stochastic </a:t>
+            </a:r>
+            <a:r>
+              <a:rPr lang="en-US" sz="2400" dirty="0" smtClean="0"/>
+              <a:t>simulation </a:t>
+            </a:r>
+            <a:r>
+              <a:rPr lang="en-US" sz="2400" dirty="0"/>
+              <a:t>i</a:t>
+            </a:r>
+            <a:r>
+              <a:rPr lang="en-US" sz="2400" dirty="0" smtClean="0"/>
+              <a:t>n COPASI </a:t>
+            </a:r>
+          </a:p>
+          <a:p>
+            <a:pPr>
+              <a:lnSpc>
+                <a:spcPct val="150000"/>
+              </a:lnSpc>
+            </a:pPr>
+            <a:endParaRPr lang="en-US" sz="2400" dirty="0"/>
+          </a:p>
+          <a:p>
+            <a:pPr>
+              <a:lnSpc>
+                <a:spcPct val="150000"/>
+              </a:lnSpc>
+            </a:pPr>
+            <a:endParaRPr lang="en-US" sz="2400" dirty="0"/>
           </a:p>
         </p:txBody>
       </p:sp>
@@ -3773,6 +4173,13 @@
   <p:clrMapOvr>
     <a:masterClrMapping/>
   </p:clrMapOvr>
+  <p:timing>
+    <p:tnLst>
+      <p:par>
+        <p:cTn xmlns:p14="http://schemas.microsoft.com/office/powerpoint/2010/main" id="1" dur="indefinite" restart="never" nodeType="tmRoot"/>
+      </p:par>
+    </p:tnLst>
+  </p:timing>
 </p:sld>
 </file>
 
@@ -3842,7 +4249,11 @@
               <a:buNone/>
             </a:pPr>
             <a:r>
-              <a:rPr lang="en-US" dirty="0" smtClean="0"/>
+              <a:rPr lang="en-US" dirty="0" smtClean="0">
+                <a:solidFill>
+                  <a:srgbClr val="000000"/>
+                </a:solidFill>
+              </a:rPr>
               <a:t>3.9. Macromolecular Complexation</a:t>
             </a:r>
           </a:p>
@@ -3851,7 +4262,11 @@
               <a:buNone/>
             </a:pPr>
             <a:r>
-              <a:rPr lang="en-US" dirty="0" smtClean="0"/>
+              <a:rPr lang="en-US" dirty="0" smtClean="0">
+                <a:solidFill>
+                  <a:srgbClr val="000000"/>
+                </a:solidFill>
+              </a:rPr>
               <a:t>3.11. Protein Activation</a:t>
             </a:r>
           </a:p>
@@ -3860,7 +4275,11 @@
               <a:buNone/>
             </a:pPr>
             <a:r>
-              <a:rPr lang="en-US" dirty="0" smtClean="0"/>
+              <a:rPr lang="en-US" dirty="0" smtClean="0">
+                <a:solidFill>
+                  <a:srgbClr val="000000"/>
+                </a:solidFill>
+              </a:rPr>
               <a:t>3.12. Protein Decay</a:t>
             </a:r>
           </a:p>
@@ -3869,7 +4288,11 @@
               <a:buNone/>
             </a:pPr>
             <a:r>
-              <a:rPr lang="en-US" dirty="0" smtClean="0"/>
+              <a:rPr lang="en-US" dirty="0" smtClean="0">
+                <a:solidFill>
+                  <a:srgbClr val="000000"/>
+                </a:solidFill>
+              </a:rPr>
               <a:t>3.13. Protein Folding</a:t>
             </a:r>
           </a:p>
@@ -3878,7 +4301,11 @@
               <a:buNone/>
             </a:pPr>
             <a:r>
-              <a:rPr lang="en-US" dirty="0" smtClean="0"/>
+              <a:rPr lang="en-US" dirty="0" smtClean="0">
+                <a:solidFill>
+                  <a:srgbClr val="000000"/>
+                </a:solidFill>
+              </a:rPr>
               <a:t>3.14. Protein Modification</a:t>
             </a:r>
           </a:p>
@@ -3887,7 +4314,11 @@
               <a:buNone/>
             </a:pPr>
             <a:r>
-              <a:rPr lang="en-US" dirty="0" smtClean="0"/>
+              <a:rPr lang="en-US" dirty="0" smtClean="0">
+                <a:solidFill>
+                  <a:srgbClr val="000000"/>
+                </a:solidFill>
+              </a:rPr>
               <a:t>3.15. Protein Processing I</a:t>
             </a:r>
           </a:p>
@@ -3896,7 +4327,11 @@
               <a:buNone/>
             </a:pPr>
             <a:r>
-              <a:rPr lang="en-US" dirty="0" smtClean="0"/>
+              <a:rPr lang="en-US" dirty="0" smtClean="0">
+                <a:solidFill>
+                  <a:srgbClr val="000000"/>
+                </a:solidFill>
+              </a:rPr>
               <a:t>3.16. Protein Processing II</a:t>
             </a:r>
           </a:p>
@@ -3905,7 +4340,11 @@
               <a:buNone/>
             </a:pPr>
             <a:r>
-              <a:rPr lang="en-US" dirty="0" smtClean="0"/>
+              <a:rPr lang="en-US" dirty="0" smtClean="0">
+                <a:solidFill>
+                  <a:srgbClr val="000000"/>
+                </a:solidFill>
+              </a:rPr>
               <a:t>3.17. Protein Translocation</a:t>
             </a:r>
           </a:p>
@@ -3914,7 +4353,11 @@
               <a:buNone/>
             </a:pPr>
             <a:r>
-              <a:rPr lang="en-US" dirty="0" smtClean="0"/>
+              <a:rPr lang="en-US" dirty="0" smtClean="0">
+                <a:solidFill>
+                  <a:srgbClr val="000000"/>
+                </a:solidFill>
+              </a:rPr>
               <a:t>3.20. Ribosome Assembly</a:t>
             </a:r>
           </a:p>
@@ -3923,10 +4366,18 @@
               <a:buNone/>
             </a:pPr>
             <a:r>
-              <a:rPr lang="en-US" dirty="0" smtClean="0"/>
+              <a:rPr lang="en-US" dirty="0" smtClean="0">
+                <a:solidFill>
+                  <a:srgbClr val="000000"/>
+                </a:solidFill>
+              </a:rPr>
               <a:t>3.24. Terminal Organelle Assembly</a:t>
             </a:r>
-            <a:endParaRPr lang="en-US" dirty="0"/>
+            <a:endParaRPr lang="en-US" dirty="0">
+              <a:solidFill>
+                <a:srgbClr val="000000"/>
+              </a:solidFill>
+            </a:endParaRPr>
           </a:p>
         </p:txBody>
       </p:sp>
@@ -3981,7 +4432,7 @@
                                         </p:attrNameLst>
                                       </p:cBhvr>
                                       <p:to>
-                                        <a:srgbClr val="FF6600"/>
+                                        <a:srgbClr val="339900"/>
                                       </p:to>
                                     </p:animClr>
                                   </p:childTnLst>
@@ -4435,10 +4886,10 @@
             <a:r>
               <a:rPr lang="en-US" sz="2000" dirty="0" smtClean="0">
                 <a:solidFill>
-                  <a:srgbClr val="FF0000"/>
+                  <a:srgbClr val="000000"/>
                 </a:solidFill>
               </a:rPr>
-              <a:t>Python script is prepared to get all the reactions (over 200) from the KnowledgeBase.</a:t>
+              <a:t>Python script was written to parse all the reactions (i.e. 201 reactıons) from the KnowledgeBase into SBML.</a:t>
             </a:r>
           </a:p>
           <a:p>
@@ -4450,42 +4901,28 @@
               <a:buChar char="•"/>
             </a:pPr>
             <a:r>
+              <a:rPr lang="en-US" sz="2000" dirty="0" err="1" smtClean="0">
+                <a:solidFill>
+                  <a:srgbClr val="000000"/>
+                </a:solidFill>
+              </a:rPr>
+              <a:t>CellDesigner</a:t>
+            </a:r>
+            <a:r>
               <a:rPr lang="en-US" sz="2000" dirty="0" smtClean="0">
                 <a:solidFill>
-                  <a:srgbClr val="FF0000"/>
+                  <a:srgbClr val="000000"/>
                 </a:solidFill>
               </a:rPr>
-              <a:t>etc.</a:t>
-            </a:r>
-          </a:p>
-          <a:p>
-            <a:pPr marL="285750" indent="-285750">
-              <a:lnSpc>
-                <a:spcPct val="150000"/>
-              </a:lnSpc>
-              <a:buFont typeface="Arial"/>
-              <a:buChar char="•"/>
-            </a:pPr>
-            <a:r>
-              <a:rPr lang="en-US" sz="2000" dirty="0" smtClean="0">
-                <a:solidFill>
-                  <a:srgbClr val="FF0000"/>
-                </a:solidFill>
-              </a:rPr>
-              <a:t>etc.</a:t>
-            </a:r>
-            <a:endParaRPr lang="en-US" sz="2000" dirty="0" smtClean="0">
-              <a:solidFill>
-                <a:srgbClr val="FF0000"/>
-              </a:solidFill>
-            </a:endParaRPr>
+              <a:t> and COPASI used for vısualızatıon and stochastıc simulatıon, respectively.</a:t>
+            </a:r>
           </a:p>
         </p:txBody>
       </p:sp>
     </p:spTree>
     <p:extLst>
       <p:ext uri="{BB962C8B-B14F-4D97-AF65-F5344CB8AC3E}">
-        <p14:creationId xmlns:p14="http://schemas.microsoft.com/office/powerpoint/2010/main" val="4091481629"/>
+        <p14:creationId xmlns:p14="http://schemas.microsoft.com/office/powerpoint/2010/main" val="2261081406"/>
       </p:ext>
     </p:extLst>
   </p:cSld>
@@ -4531,14 +4968,12 @@
         </p:nvSpPr>
         <p:spPr/>
         <p:txBody>
-          <a:bodyPr>
-            <a:normAutofit/>
-          </a:bodyPr>
+          <a:bodyPr/>
           <a:lstStyle/>
           <a:p>
             <a:r>
               <a:rPr lang="en-US" dirty="0" smtClean="0"/>
-              <a:t>3.11. Protein Activation</a:t>
+              <a:t>3.9. Macromolecular Complexation</a:t>
             </a:r>
             <a:endParaRPr lang="en-US" dirty="0"/>
           </a:p>
@@ -4546,13 +4981,13 @@
       </p:sp>
       <p:pic>
         <p:nvPicPr>
-          <p:cNvPr id="6" name="Picture 5" descr="ProteinActivation-map.eps"/>
+          <p:cNvPr id="3" name="Picture 2" descr="mc_plot_ex_01.png"/>
           <p:cNvPicPr>
             <a:picLocks noChangeAspect="1"/>
           </p:cNvPicPr>
           <p:nvPr/>
         </p:nvPicPr>
-        <p:blipFill rotWithShape="1">
+        <p:blipFill>
           <a:blip r:embed="rId2">
             <a:extLst>
               <a:ext uri="{28A0092B-C50C-407E-A947-70E740481C1C}">
@@ -4560,13 +4995,14 @@
               </a:ext>
             </a:extLst>
           </a:blip>
-          <a:srcRect b="4143"/>
-          <a:stretch/>
+          <a:stretch>
+            <a:fillRect/>
+          </a:stretch>
         </p:blipFill>
         <p:spPr>
           <a:xfrm>
-            <a:off x="1622401" y="1350088"/>
-            <a:ext cx="6191141" cy="5400000"/>
+            <a:off x="305986" y="1541824"/>
+            <a:ext cx="8498651" cy="4680000"/>
           </a:xfrm>
           <a:prstGeom prst="rect">
             <a:avLst/>
@@ -4576,7 +5012,7 @@
     </p:spTree>
     <p:extLst>
       <p:ext uri="{BB962C8B-B14F-4D97-AF65-F5344CB8AC3E}">
-        <p14:creationId xmlns:p14="http://schemas.microsoft.com/office/powerpoint/2010/main" val="2148759012"/>
+        <p14:creationId xmlns:p14="http://schemas.microsoft.com/office/powerpoint/2010/main" val="4091481629"/>
       </p:ext>
     </p:extLst>
   </p:cSld>
@@ -4635,86 +5071,40 @@
           </a:p>
         </p:txBody>
       </p:sp>
-      <p:sp>
-        <p:nvSpPr>
-          <p:cNvPr id="3" name="TextBox 2"/>
-          <p:cNvSpPr txBox="1"/>
+      <p:pic>
+        <p:nvPicPr>
+          <p:cNvPr id="3" name="Picture 2" descr="ProteinActivation-map.eps"/>
+          <p:cNvPicPr>
+            <a:picLocks noChangeAspect="1"/>
+          </p:cNvPicPr>
           <p:nvPr/>
-        </p:nvSpPr>
+        </p:nvPicPr>
+        <p:blipFill>
+          <a:blip r:embed="rId2">
+            <a:extLst>
+              <a:ext uri="{28A0092B-C50C-407E-A947-70E740481C1C}">
+                <a14:useLocalDpi xmlns:a14="http://schemas.microsoft.com/office/drawing/2010/main" val="0"/>
+              </a:ext>
+            </a:extLst>
+          </a:blip>
+          <a:stretch>
+            <a:fillRect/>
+          </a:stretch>
+        </p:blipFill>
         <p:spPr>
           <a:xfrm>
-            <a:off x="797187" y="1904906"/>
-            <a:ext cx="7889613" cy="2375009"/>
+            <a:off x="1709157" y="1458000"/>
+            <a:ext cx="5934653" cy="5400000"/>
           </a:xfrm>
           <a:prstGeom prst="rect">
             <a:avLst/>
           </a:prstGeom>
-          <a:noFill/>
         </p:spPr>
-        <p:txBody>
-          <a:bodyPr wrap="square" rtlCol="0">
-            <a:spAutoFit/>
-          </a:bodyPr>
-          <a:lstStyle/>
-          <a:p>
-            <a:pPr marL="285750" indent="-285750">
-              <a:lnSpc>
-                <a:spcPct val="150000"/>
-              </a:lnSpc>
-              <a:buFont typeface="Arial"/>
-              <a:buChar char="•"/>
-            </a:pPr>
-            <a:r>
-              <a:rPr lang="en-US" sz="2000" dirty="0" smtClean="0"/>
-              <a:t>Model is prepared using COPASI</a:t>
-            </a:r>
-          </a:p>
-          <a:p>
-            <a:pPr marL="285750" indent="-285750">
-              <a:lnSpc>
-                <a:spcPct val="150000"/>
-              </a:lnSpc>
-              <a:buFont typeface="Arial"/>
-              <a:buChar char="•"/>
-            </a:pPr>
-            <a:r>
-              <a:rPr lang="en-US" sz="2000" dirty="0" smtClean="0"/>
-              <a:t>All/nothing type reactions</a:t>
-            </a:r>
-          </a:p>
-          <a:p>
-            <a:pPr marL="285750" indent="-285750">
-              <a:lnSpc>
-                <a:spcPct val="150000"/>
-              </a:lnSpc>
-              <a:buFont typeface="Arial"/>
-              <a:buChar char="•"/>
-            </a:pPr>
-            <a:r>
-              <a:rPr lang="en-US" sz="2000" dirty="0" smtClean="0"/>
-              <a:t>EVENTS are triggered when metabolite, temperature etc. requirements are satisfied.</a:t>
-            </a:r>
-          </a:p>
-          <a:p>
-            <a:pPr marL="285750" indent="-285750">
-              <a:lnSpc>
-                <a:spcPct val="150000"/>
-              </a:lnSpc>
-              <a:buFont typeface="Arial"/>
-              <a:buChar char="•"/>
-            </a:pPr>
-            <a:r>
-              <a:rPr lang="en-US" sz="2000" dirty="0" smtClean="0"/>
-              <a:t>Model tested, seems valid.</a:t>
-            </a:r>
-            <a:endParaRPr lang="en-US" sz="2000" dirty="0"/>
-          </a:p>
-        </p:txBody>
-      </p:sp>
+      </p:pic>
     </p:spTree>
     <p:extLst>
       <p:ext uri="{BB962C8B-B14F-4D97-AF65-F5344CB8AC3E}">
-        <p14:creationId xmlns:p14="http://schemas.microsoft.com/office/powerpoint/2010/main" val="562772597"/>
+        <p14:creationId xmlns:p14="http://schemas.microsoft.com/office/powerpoint/2010/main" val="2148759012"/>
       </p:ext>
     </p:extLst>
   </p:cSld>
@@ -4767,22 +5157,133 @@
           <a:p>
             <a:r>
               <a:rPr lang="en-US" dirty="0" smtClean="0"/>
-              <a:t>3.13. Protein Folding</a:t>
+              <a:t>3.11. Protein Activation</a:t>
             </a:r>
             <a:endParaRPr lang="en-US" dirty="0"/>
+          </a:p>
+        </p:txBody>
+      </p:sp>
+      <p:sp>
+        <p:nvSpPr>
+          <p:cNvPr id="3" name="TextBox 2"/>
+          <p:cNvSpPr txBox="1"/>
+          <p:nvPr/>
+        </p:nvSpPr>
+        <p:spPr>
+          <a:xfrm>
+            <a:off x="797187" y="1904906"/>
+            <a:ext cx="7889613" cy="3385542"/>
+          </a:xfrm>
+          <a:prstGeom prst="rect">
+            <a:avLst/>
+          </a:prstGeom>
+          <a:noFill/>
+        </p:spPr>
+        <p:txBody>
+          <a:bodyPr wrap="square" rtlCol="0">
+            <a:spAutoFit/>
+          </a:bodyPr>
+          <a:lstStyle/>
+          <a:p>
+            <a:pPr marL="285750" indent="-285750">
+              <a:lnSpc>
+                <a:spcPct val="150000"/>
+              </a:lnSpc>
+              <a:buFont typeface="Arial"/>
+              <a:buChar char="•"/>
+            </a:pPr>
+            <a:r>
+              <a:rPr lang="en-US" sz="2400" dirty="0" smtClean="0"/>
+              <a:t>Model is prepared using COPASI</a:t>
+            </a:r>
+          </a:p>
+          <a:p>
+            <a:pPr marL="285750" indent="-285750">
+              <a:lnSpc>
+                <a:spcPct val="150000"/>
+              </a:lnSpc>
+              <a:buFont typeface="Arial"/>
+              <a:buChar char="•"/>
+            </a:pPr>
+            <a:r>
+              <a:rPr lang="en-US" sz="2400" dirty="0" smtClean="0"/>
+              <a:t>All/nothing type reactions</a:t>
+            </a:r>
+          </a:p>
+          <a:p>
+            <a:pPr marL="285750" indent="-285750">
+              <a:lnSpc>
+                <a:spcPct val="150000"/>
+              </a:lnSpc>
+              <a:buFont typeface="Arial"/>
+              <a:buChar char="•"/>
+            </a:pPr>
+            <a:r>
+              <a:rPr lang="en-US" sz="2400" dirty="0" smtClean="0"/>
+              <a:t>EVENTS are triggered when metabolite, temperature etc. requirements are satisfied.</a:t>
+            </a:r>
+          </a:p>
+          <a:p>
+            <a:pPr marL="285750" indent="-285750">
+              <a:lnSpc>
+                <a:spcPct val="150000"/>
+              </a:lnSpc>
+              <a:buFont typeface="Arial"/>
+              <a:buChar char="•"/>
+            </a:pPr>
+            <a:r>
+              <a:rPr lang="en-US" sz="2400" dirty="0"/>
+              <a:t>We </a:t>
+            </a:r>
+            <a:r>
+              <a:rPr lang="en-US" sz="2400" dirty="0" smtClean="0"/>
+              <a:t>did </a:t>
+            </a:r>
+            <a:r>
+              <a:rPr lang="en-US" sz="2400" dirty="0"/>
+              <a:t>a round-</a:t>
+            </a:r>
+            <a:r>
+              <a:rPr lang="en-US" sz="2400" dirty="0" smtClean="0"/>
+              <a:t>trip</a:t>
+            </a:r>
+            <a:r>
+              <a:rPr lang="en-US" sz="2400" dirty="0"/>
+              <a:t>: </a:t>
+            </a:r>
+            <a:r>
+              <a:rPr lang="en-US" sz="2400" dirty="0" smtClean="0"/>
+              <a:t>COPASI </a:t>
+            </a:r>
+            <a:r>
+              <a:rPr lang="en-US" sz="2400" dirty="0"/>
+              <a:t>to SBML back to </a:t>
+            </a:r>
+            <a:r>
+              <a:rPr lang="en-US" sz="2400" dirty="0" smtClean="0"/>
+              <a:t>COPASI. Model tested, seems valid.</a:t>
+            </a:r>
+            <a:endParaRPr lang="en-US" sz="2400" dirty="0"/>
           </a:p>
         </p:txBody>
       </p:sp>
     </p:spTree>
     <p:extLst>
       <p:ext uri="{BB962C8B-B14F-4D97-AF65-F5344CB8AC3E}">
-        <p14:creationId xmlns:p14="http://schemas.microsoft.com/office/powerpoint/2010/main" val="2148759012"/>
+        <p14:creationId xmlns:p14="http://schemas.microsoft.com/office/powerpoint/2010/main" val="562772597"/>
       </p:ext>
     </p:extLst>
   </p:cSld>
   <p:clrMapOvr>
     <a:masterClrMapping/>
   </p:clrMapOvr>
+  <p:timing>
+    <p:tnLst>
+      <p:par>
+        <p:cTn xmlns:p14="http://schemas.microsoft.com/office/powerpoint/2010/main" id="1" dur="indefinite" restart="never" nodeType="tmRoot"/>
+      </p:par>
+    </p:tnLst>
+  </p:timing>
 </p:sld>
 </file>
 
@@ -4822,9 +5323,95 @@
           <a:p>
             <a:r>
               <a:rPr lang="en-US" dirty="0" smtClean="0"/>
-              <a:t>3.17. Protein Translocation</a:t>
+              <a:t>3.13. Protein Folding</a:t>
             </a:r>
             <a:endParaRPr lang="en-US" dirty="0"/>
+          </a:p>
+        </p:txBody>
+      </p:sp>
+      <p:sp>
+        <p:nvSpPr>
+          <p:cNvPr id="3" name="TextBox 2"/>
+          <p:cNvSpPr txBox="1"/>
+          <p:nvPr/>
+        </p:nvSpPr>
+        <p:spPr>
+          <a:xfrm>
+            <a:off x="772503" y="1898635"/>
+            <a:ext cx="7914298" cy="3416320"/>
+          </a:xfrm>
+          <a:prstGeom prst="rect">
+            <a:avLst/>
+          </a:prstGeom>
+          <a:noFill/>
+        </p:spPr>
+        <p:txBody>
+          <a:bodyPr wrap="square" rtlCol="0">
+            <a:spAutoFit/>
+          </a:bodyPr>
+          <a:lstStyle/>
+          <a:p>
+            <a:pPr marL="285750" indent="-285750">
+              <a:buFont typeface="Arial"/>
+              <a:buChar char="•"/>
+            </a:pPr>
+            <a:r>
+              <a:rPr lang="en-US" sz="2400" dirty="0" smtClean="0"/>
+              <a:t>We now have the Python script to extract the relevant data from the Supplementary Excel File(s)</a:t>
+            </a:r>
+          </a:p>
+          <a:p>
+            <a:pPr marL="285750" indent="-285750">
+              <a:buFont typeface="Arial"/>
+              <a:buChar char="•"/>
+            </a:pPr>
+            <a:endParaRPr lang="en-US" sz="2400" dirty="0"/>
+          </a:p>
+          <a:p>
+            <a:pPr marL="285750" indent="-285750">
+              <a:buFont typeface="Arial"/>
+              <a:buChar char="•"/>
+            </a:pPr>
+            <a:r>
+              <a:rPr lang="en-US" sz="2400" dirty="0" smtClean="0"/>
+              <a:t>Initially </a:t>
+            </a:r>
+            <a:r>
+              <a:rPr lang="en-US" sz="2400" dirty="0" smtClean="0"/>
+              <a:t>we had some problems with random distribution</a:t>
+            </a:r>
+          </a:p>
+          <a:p>
+            <a:pPr marL="285750" indent="-285750">
+              <a:buFont typeface="Arial"/>
+              <a:buChar char="•"/>
+            </a:pPr>
+            <a:endParaRPr lang="en-US" sz="2400" dirty="0"/>
+          </a:p>
+          <a:p>
+            <a:pPr marL="285750" indent="-285750">
+              <a:buFont typeface="Arial"/>
+              <a:buChar char="•"/>
+            </a:pPr>
+            <a:r>
+              <a:rPr lang="en-US" sz="2400" dirty="0" smtClean="0"/>
+              <a:t>We have now found a way to do Stochastic simulation in </a:t>
+            </a:r>
+            <a:r>
+              <a:rPr lang="en-US" sz="2400" dirty="0" smtClean="0"/>
+              <a:t>COPASI </a:t>
+            </a:r>
+            <a:r>
+              <a:rPr lang="en-US" sz="2400" dirty="0" smtClean="0"/>
+              <a:t>where the rate constant for each reaction is weighted</a:t>
+            </a:r>
+          </a:p>
+          <a:p>
+            <a:pPr marL="285750" indent="-285750">
+              <a:buFont typeface="Arial"/>
+              <a:buChar char="•"/>
+            </a:pPr>
+            <a:endParaRPr lang="en-US" sz="2400" dirty="0"/>
           </a:p>
         </p:txBody>
       </p:sp>
@@ -4838,6 +5425,13 @@
   <p:clrMapOvr>
     <a:masterClrMapping/>
   </p:clrMapOvr>
+  <p:timing>
+    <p:tnLst>
+      <p:par>
+        <p:cTn xmlns:p14="http://schemas.microsoft.com/office/powerpoint/2010/main" id="1" dur="indefinite" restart="never" nodeType="tmRoot"/>
+      </p:par>
+    </p:tnLst>
+  </p:timing>
 </p:sld>
 </file>
 
@@ -4885,7 +5479,7 @@
       </p:sp>
       <p:pic>
         <p:nvPicPr>
-          <p:cNvPr id="4" name="Picture 3" descr="RibosomeAssembly-map.eps"/>
+          <p:cNvPr id="3" name="Picture 2" descr="RibosomeAssembly-map.eps"/>
           <p:cNvPicPr>
             <a:picLocks noChangeAspect="1"/>
           </p:cNvPicPr>
@@ -4905,7 +5499,7 @@
         </p:blipFill>
         <p:spPr>
           <a:xfrm>
-            <a:off x="1176516" y="1666098"/>
+            <a:off x="1067586" y="1632208"/>
             <a:ext cx="7048500" cy="4864100"/>
           </a:xfrm>
           <a:prstGeom prst="rect">
@@ -4923,6 +5517,13 @@
   <p:clrMapOvr>
     <a:masterClrMapping/>
   </p:clrMapOvr>
+  <p:timing>
+    <p:tnLst>
+      <p:par>
+        <p:cTn xmlns:p14="http://schemas.microsoft.com/office/powerpoint/2010/main" id="1" dur="indefinite" restart="never" nodeType="tmRoot"/>
+      </p:par>
+    </p:tnLst>
+  </p:timing>
 </p:sld>
 </file>
 

</xml_diff>

<commit_message>
Adding the final verison of the presentation
</commit_message>
<xml_diff>
--- a/TeamProteinSummary.pptx
+++ b/TeamProteinSummary.pptx
@@ -3423,23 +3423,7 @@
                   <a:srgbClr val="000000"/>
                 </a:solidFill>
               </a:rPr>
-              <a:t>50S: Ad-hoc Python script was used to generate 50S </a:t>
-            </a:r>
-            <a:r>
-              <a:rPr lang="en-US" sz="2000" dirty="0" smtClean="0">
-                <a:solidFill>
-                  <a:srgbClr val="000000"/>
-                </a:solidFill>
-              </a:rPr>
-              <a:t>starting </a:t>
-            </a:r>
-            <a:r>
-              <a:rPr lang="en-US" sz="2000" dirty="0" smtClean="0">
-                <a:solidFill>
-                  <a:srgbClr val="000000"/>
-                </a:solidFill>
-              </a:rPr>
-              <a:t>from the 30S template</a:t>
+              <a:t>50S: Ad-hoc Python script was used to generate 50S starting from the 30S template</a:t>
             </a:r>
           </a:p>
           <a:p>
@@ -3472,15 +3456,7 @@
                   <a:srgbClr val="000000"/>
                 </a:solidFill>
               </a:rPr>
-              <a:t> </a:t>
-            </a:r>
-            <a:r>
-              <a:rPr lang="en-US" sz="2000" dirty="0" smtClean="0">
-                <a:solidFill>
-                  <a:srgbClr val="000000"/>
-                </a:solidFill>
-              </a:rPr>
-              <a:t>then manually edited to add stoichiometry</a:t>
+              <a:t> then manually edited to add stoichiometry</a:t>
             </a:r>
           </a:p>
           <a:p>
@@ -3530,23 +3506,7 @@
                   <a:srgbClr val="000000"/>
                 </a:solidFill>
               </a:rPr>
-              <a:t>n COPASI </a:t>
-            </a:r>
-            <a:r>
-              <a:rPr lang="en-US" sz="2000" dirty="0" smtClean="0">
-                <a:solidFill>
-                  <a:srgbClr val="000000"/>
-                </a:solidFill>
-              </a:rPr>
-              <a:t>using </a:t>
-            </a:r>
-            <a:r>
-              <a:rPr lang="en-US" sz="2000" dirty="0" smtClean="0">
-                <a:solidFill>
-                  <a:srgbClr val="000000"/>
-                </a:solidFill>
-              </a:rPr>
-              <a:t>a stochastic simulator </a:t>
+              <a:t>n COPASI using a stochastic simulator </a:t>
             </a:r>
           </a:p>
           <a:p>
@@ -3791,21 +3751,8 @@
                   <a:srgbClr val="000000"/>
                 </a:solidFill>
               </a:rPr>
-              <a:t>Assignments are </a:t>
-            </a:r>
-            <a:r>
-              <a:rPr lang="en-US" sz="2400" dirty="0" smtClean="0">
-                <a:solidFill>
-                  <a:srgbClr val="000000"/>
-                </a:solidFill>
-              </a:rPr>
-              <a:t>used</a:t>
-            </a:r>
-            <a:endParaRPr lang="en-US" sz="2400" dirty="0" smtClean="0">
-              <a:solidFill>
-                <a:srgbClr val="000000"/>
-              </a:solidFill>
-            </a:endParaRPr>
+              <a:t>Assignments are used</a:t>
+            </a:r>
           </a:p>
           <a:p>
             <a:pPr marL="285750" indent="-285750">
@@ -4112,13 +4059,8 @@
             </a:pPr>
             <a:r>
               <a:rPr lang="en-US" sz="2400" dirty="0" smtClean="0"/>
-              <a:t>Random </a:t>
-            </a:r>
-            <a:r>
-              <a:rPr lang="en-US" sz="2400" dirty="0" smtClean="0"/>
-              <a:t>distribution</a:t>
-            </a:r>
-            <a:endParaRPr lang="en-US" sz="2400" dirty="0" smtClean="0"/>
+              <a:t>Random distribution</a:t>
+            </a:r>
           </a:p>
           <a:p>
             <a:pPr marL="742950" lvl="1" indent="-285750">
@@ -4130,11 +4072,7 @@
             </a:pPr>
             <a:r>
               <a:rPr lang="en-US" sz="2400" dirty="0" smtClean="0"/>
-              <a:t>We have found a way to do that using weighted rate constants and stochastic </a:t>
-            </a:r>
-            <a:r>
-              <a:rPr lang="en-US" sz="2400" dirty="0" smtClean="0"/>
-              <a:t>simulation </a:t>
+              <a:t>We have found a way to do that using weighted rate constants and stochastic simulation </a:t>
             </a:r>
             <a:r>
               <a:rPr lang="en-US" sz="2400" dirty="0"/>
@@ -4756,7 +4694,7 @@
         </p:blipFill>
         <p:spPr>
           <a:xfrm>
-            <a:off x="6568199" y="1566247"/>
+            <a:off x="6568199" y="1592435"/>
             <a:ext cx="2523956" cy="2160000"/>
           </a:xfrm>
           <a:prstGeom prst="rect">
@@ -5374,11 +5312,7 @@
             </a:pPr>
             <a:r>
               <a:rPr lang="en-US" sz="2400" dirty="0" smtClean="0"/>
-              <a:t>Initially </a:t>
-            </a:r>
-            <a:r>
-              <a:rPr lang="en-US" sz="2400" dirty="0" smtClean="0"/>
-              <a:t>we had some problems with random distribution</a:t>
+              <a:t>Initially we had some problems with random distribution</a:t>
             </a:r>
           </a:p>
           <a:p>
@@ -5395,15 +5329,7 @@
             </a:pPr>
             <a:r>
               <a:rPr lang="en-US" sz="2400" dirty="0" smtClean="0"/>
-              <a:t>We have now found a way to do Stochastic simulation in </a:t>
-            </a:r>
-            <a:r>
-              <a:rPr lang="en-US" sz="2400" dirty="0" smtClean="0"/>
-              <a:t>COPASI </a:t>
-            </a:r>
-            <a:r>
-              <a:rPr lang="en-US" sz="2400" dirty="0" smtClean="0"/>
-              <a:t>where the rate constant for each reaction is weighted</a:t>
+              <a:t>We have now found a way to do Stochastic simulation in COPASI where the rate constant for each reaction is weighted</a:t>
             </a:r>
           </a:p>
           <a:p>

</xml_diff>